<commit_message>
feat: update powerpoint workflows
</commit_message>
<xml_diff>
--- a/assets/OrganizationTemplate.pptx
+++ b/assets/OrganizationTemplate.pptx
@@ -263,7 +263,7 @@
           <a:p>
             <a:fld id="{47BA2DA0-6B40-4D5C-959C-1829054D176C}" type="datetimeFigureOut">
               <a:rPr lang="en-US" smtClean="0"/>
-              <a:t>2/3/2025</a:t>
+              <a:t>2/4/2025</a:t>
             </a:fld>
             <a:endParaRPr lang="en-US"/>
           </a:p>
@@ -461,7 +461,7 @@
           <a:p>
             <a:fld id="{47BA2DA0-6B40-4D5C-959C-1829054D176C}" type="datetimeFigureOut">
               <a:rPr lang="en-US" smtClean="0"/>
-              <a:t>2/3/2025</a:t>
+              <a:t>2/4/2025</a:t>
             </a:fld>
             <a:endParaRPr lang="en-US"/>
           </a:p>
@@ -669,7 +669,7 @@
           <a:p>
             <a:fld id="{47BA2DA0-6B40-4D5C-959C-1829054D176C}" type="datetimeFigureOut">
               <a:rPr lang="en-US" smtClean="0"/>
-              <a:t>2/3/2025</a:t>
+              <a:t>2/4/2025</a:t>
             </a:fld>
             <a:endParaRPr lang="en-US"/>
           </a:p>
@@ -867,7 +867,7 @@
           <a:p>
             <a:fld id="{47BA2DA0-6B40-4D5C-959C-1829054D176C}" type="datetimeFigureOut">
               <a:rPr lang="en-US" smtClean="0"/>
-              <a:t>2/3/2025</a:t>
+              <a:t>2/4/2025</a:t>
             </a:fld>
             <a:endParaRPr lang="en-US"/>
           </a:p>
@@ -1142,7 +1142,7 @@
           <a:p>
             <a:fld id="{47BA2DA0-6B40-4D5C-959C-1829054D176C}" type="datetimeFigureOut">
               <a:rPr lang="en-US" smtClean="0"/>
-              <a:t>2/3/2025</a:t>
+              <a:t>2/4/2025</a:t>
             </a:fld>
             <a:endParaRPr lang="en-US"/>
           </a:p>
@@ -1407,7 +1407,7 @@
           <a:p>
             <a:fld id="{47BA2DA0-6B40-4D5C-959C-1829054D176C}" type="datetimeFigureOut">
               <a:rPr lang="en-US" smtClean="0"/>
-              <a:t>2/3/2025</a:t>
+              <a:t>2/4/2025</a:t>
             </a:fld>
             <a:endParaRPr lang="en-US"/>
           </a:p>
@@ -1819,7 +1819,7 @@
           <a:p>
             <a:fld id="{47BA2DA0-6B40-4D5C-959C-1829054D176C}" type="datetimeFigureOut">
               <a:rPr lang="en-US" smtClean="0"/>
-              <a:t>2/3/2025</a:t>
+              <a:t>2/4/2025</a:t>
             </a:fld>
             <a:endParaRPr lang="en-US"/>
           </a:p>
@@ -1960,7 +1960,7 @@
           <a:p>
             <a:fld id="{47BA2DA0-6B40-4D5C-959C-1829054D176C}" type="datetimeFigureOut">
               <a:rPr lang="en-US" smtClean="0"/>
-              <a:t>2/3/2025</a:t>
+              <a:t>2/4/2025</a:t>
             </a:fld>
             <a:endParaRPr lang="en-US"/>
           </a:p>
@@ -2073,7 +2073,7 @@
           <a:p>
             <a:fld id="{47BA2DA0-6B40-4D5C-959C-1829054D176C}" type="datetimeFigureOut">
               <a:rPr lang="en-US" smtClean="0"/>
-              <a:t>2/3/2025</a:t>
+              <a:t>2/4/2025</a:t>
             </a:fld>
             <a:endParaRPr lang="en-US"/>
           </a:p>
@@ -2384,7 +2384,7 @@
           <a:p>
             <a:fld id="{47BA2DA0-6B40-4D5C-959C-1829054D176C}" type="datetimeFigureOut">
               <a:rPr lang="en-US" smtClean="0"/>
-              <a:t>2/3/2025</a:t>
+              <a:t>2/4/2025</a:t>
             </a:fld>
             <a:endParaRPr lang="en-US"/>
           </a:p>
@@ -2672,7 +2672,7 @@
           <a:p>
             <a:fld id="{47BA2DA0-6B40-4D5C-959C-1829054D176C}" type="datetimeFigureOut">
               <a:rPr lang="en-US" smtClean="0"/>
-              <a:t>2/3/2025</a:t>
+              <a:t>2/4/2025</a:t>
             </a:fld>
             <a:endParaRPr lang="en-US"/>
           </a:p>
@@ -2913,7 +2913,7 @@
           <a:p>
             <a:fld id="{47BA2DA0-6B40-4D5C-959C-1829054D176C}" type="datetimeFigureOut">
               <a:rPr lang="en-US" smtClean="0"/>
-              <a:t>2/3/2025</a:t>
+              <a:t>2/4/2025</a:t>
             </a:fld>
             <a:endParaRPr lang="en-US"/>
           </a:p>
@@ -5967,7 +5967,7 @@
         </p:spPr>
         <p:txBody>
           <a:bodyPr>
-            <a:normAutofit/>
+            <a:noAutofit/>
           </a:bodyPr>
           <a:lstStyle/>
           <a:p>
@@ -6120,7 +6120,7 @@
             </a:extLst>
           </p:cNvPr>
           <p:cNvSpPr>
-            <a:spLocks noGrp="1"/>
+            <a:spLocks noGrp="1" noChangeAspect="1"/>
           </p:cNvSpPr>
           <p:nvPr>
             <p:ph idx="1"/>
@@ -6134,7 +6134,7 @@
         </p:spPr>
         <p:txBody>
           <a:bodyPr>
-            <a:normAutofit/>
+            <a:noAutofit/>
           </a:bodyPr>
           <a:lstStyle/>
           <a:p>
@@ -6147,7 +6147,7 @@
             </a:r>
             <a:r>
               <a:rPr lang="en-US" sz="1800" dirty="0"/>
-              <a:t> to “What makes your products and services stand out in your market?”</a:t>
+              <a:t> to “What makes your products and services stand out in your market?”: List products and services with key differentiations</a:t>
             </a:r>
           </a:p>
         </p:txBody>
@@ -6333,7 +6333,7 @@
         </p:spPr>
         <p:txBody>
           <a:bodyPr>
-            <a:normAutofit/>
+            <a:noAutofit/>
           </a:bodyPr>
           <a:lstStyle/>
           <a:p>
@@ -6346,7 +6346,7 @@
             </a:r>
             <a:r>
               <a:rPr lang="en-US" sz="1800" dirty="0"/>
-              <a:t> to “How do you ensure the delivery of your offering?”</a:t>
+              <a:t> to “How do you ensure the delivery of your offering?”: List technological and human capabilities of the organization</a:t>
             </a:r>
           </a:p>
         </p:txBody>
@@ -6532,7 +6532,7 @@
         </p:spPr>
         <p:txBody>
           <a:bodyPr>
-            <a:normAutofit/>
+            <a:noAutofit/>
           </a:bodyPr>
           <a:lstStyle/>
           <a:p>
@@ -6545,7 +6545,15 @@
             </a:r>
             <a:r>
               <a:rPr lang="en-US" sz="1800" dirty="0"/>
-              <a:t> to “What are the current dynamics of your market?”</a:t>
+              <a:t> to “What are the current dynamics of your market?” : Provide market size and </a:t>
+            </a:r>
+            <a:r>
+              <a:rPr lang="en-US" sz="1800" dirty="0" err="1"/>
+              <a:t>cagr</a:t>
+            </a:r>
+            <a:r>
+              <a:rPr lang="en-US" sz="1800" dirty="0"/>
+              <a:t> evolution and global overview</a:t>
             </a:r>
           </a:p>
         </p:txBody>
@@ -6726,12 +6734,12 @@
         <p:spPr>
           <a:xfrm>
             <a:off x="838200" y="2192594"/>
-            <a:ext cx="10515600" cy="3984369"/>
+            <a:ext cx="10515600" cy="343235"/>
           </a:xfrm>
         </p:spPr>
         <p:txBody>
           <a:bodyPr>
-            <a:normAutofit/>
+            <a:noAutofit/>
           </a:bodyPr>
           <a:lstStyle/>
           <a:p>
@@ -6744,7 +6752,7 @@
             </a:r>
             <a:r>
               <a:rPr lang="en-US" sz="1800" dirty="0"/>
-              <a:t> to “How do you position yourself vs your competitors?”</a:t>
+              <a:t> to “How do you position yourself vs your competitors?”: Develop 3 main ideas</a:t>
             </a:r>
           </a:p>
         </p:txBody>

</xml_diff>

<commit_message>
feat: get slides structure, improv ppt prompt, update logo
</commit_message>
<xml_diff>
--- a/assets/OrganizationTemplate.pptx
+++ b/assets/OrganizationTemplate.pptx
@@ -263,7 +263,7 @@
           <a:p>
             <a:fld id="{47BA2DA0-6B40-4D5C-959C-1829054D176C}" type="datetimeFigureOut">
               <a:rPr lang="en-US" smtClean="0"/>
-              <a:t>2/4/2025</a:t>
+              <a:t>2/5/2025</a:t>
             </a:fld>
             <a:endParaRPr lang="en-US"/>
           </a:p>
@@ -461,7 +461,7 @@
           <a:p>
             <a:fld id="{47BA2DA0-6B40-4D5C-959C-1829054D176C}" type="datetimeFigureOut">
               <a:rPr lang="en-US" smtClean="0"/>
-              <a:t>2/4/2025</a:t>
+              <a:t>2/5/2025</a:t>
             </a:fld>
             <a:endParaRPr lang="en-US"/>
           </a:p>
@@ -669,7 +669,7 @@
           <a:p>
             <a:fld id="{47BA2DA0-6B40-4D5C-959C-1829054D176C}" type="datetimeFigureOut">
               <a:rPr lang="en-US" smtClean="0"/>
-              <a:t>2/4/2025</a:t>
+              <a:t>2/5/2025</a:t>
             </a:fld>
             <a:endParaRPr lang="en-US"/>
           </a:p>
@@ -867,7 +867,7 @@
           <a:p>
             <a:fld id="{47BA2DA0-6B40-4D5C-959C-1829054D176C}" type="datetimeFigureOut">
               <a:rPr lang="en-US" smtClean="0"/>
-              <a:t>2/4/2025</a:t>
+              <a:t>2/5/2025</a:t>
             </a:fld>
             <a:endParaRPr lang="en-US"/>
           </a:p>
@@ -1142,7 +1142,7 @@
           <a:p>
             <a:fld id="{47BA2DA0-6B40-4D5C-959C-1829054D176C}" type="datetimeFigureOut">
               <a:rPr lang="en-US" smtClean="0"/>
-              <a:t>2/4/2025</a:t>
+              <a:t>2/5/2025</a:t>
             </a:fld>
             <a:endParaRPr lang="en-US"/>
           </a:p>
@@ -1407,7 +1407,7 @@
           <a:p>
             <a:fld id="{47BA2DA0-6B40-4D5C-959C-1829054D176C}" type="datetimeFigureOut">
               <a:rPr lang="en-US" smtClean="0"/>
-              <a:t>2/4/2025</a:t>
+              <a:t>2/5/2025</a:t>
             </a:fld>
             <a:endParaRPr lang="en-US"/>
           </a:p>
@@ -1819,7 +1819,7 @@
           <a:p>
             <a:fld id="{47BA2DA0-6B40-4D5C-959C-1829054D176C}" type="datetimeFigureOut">
               <a:rPr lang="en-US" smtClean="0"/>
-              <a:t>2/4/2025</a:t>
+              <a:t>2/5/2025</a:t>
             </a:fld>
             <a:endParaRPr lang="en-US"/>
           </a:p>
@@ -1960,7 +1960,7 @@
           <a:p>
             <a:fld id="{47BA2DA0-6B40-4D5C-959C-1829054D176C}" type="datetimeFigureOut">
               <a:rPr lang="en-US" smtClean="0"/>
-              <a:t>2/4/2025</a:t>
+              <a:t>2/5/2025</a:t>
             </a:fld>
             <a:endParaRPr lang="en-US"/>
           </a:p>
@@ -2073,7 +2073,7 @@
           <a:p>
             <a:fld id="{47BA2DA0-6B40-4D5C-959C-1829054D176C}" type="datetimeFigureOut">
               <a:rPr lang="en-US" smtClean="0"/>
-              <a:t>2/4/2025</a:t>
+              <a:t>2/5/2025</a:t>
             </a:fld>
             <a:endParaRPr lang="en-US"/>
           </a:p>
@@ -2384,7 +2384,7 @@
           <a:p>
             <a:fld id="{47BA2DA0-6B40-4D5C-959C-1829054D176C}" type="datetimeFigureOut">
               <a:rPr lang="en-US" smtClean="0"/>
-              <a:t>2/4/2025</a:t>
+              <a:t>2/5/2025</a:t>
             </a:fld>
             <a:endParaRPr lang="en-US"/>
           </a:p>
@@ -2672,7 +2672,7 @@
           <a:p>
             <a:fld id="{47BA2DA0-6B40-4D5C-959C-1829054D176C}" type="datetimeFigureOut">
               <a:rPr lang="en-US" smtClean="0"/>
-              <a:t>2/4/2025</a:t>
+              <a:t>2/5/2025</a:t>
             </a:fld>
             <a:endParaRPr lang="en-US"/>
           </a:p>
@@ -2913,7 +2913,7 @@
           <a:p>
             <a:fld id="{47BA2DA0-6B40-4D5C-959C-1829054D176C}" type="datetimeFigureOut">
               <a:rPr lang="en-US" smtClean="0"/>
-              <a:t>2/4/2025</a:t>
+              <a:t>2/5/2025</a:t>
             </a:fld>
             <a:endParaRPr lang="en-US"/>
           </a:p>
@@ -5961,13 +5961,13 @@
         </p:nvSpPr>
         <p:spPr>
           <a:xfrm>
-            <a:off x="773408" y="992094"/>
-            <a:ext cx="3616913" cy="2795160"/>
+            <a:off x="773408" y="2916823"/>
+            <a:ext cx="3616913" cy="870431"/>
           </a:xfrm>
         </p:spPr>
         <p:txBody>
-          <a:bodyPr>
-            <a:noAutofit/>
+          <a:bodyPr wrap="square">
+            <a:spAutoFit/>
           </a:bodyPr>
           <a:lstStyle/>
           <a:p>
@@ -6148,6 +6148,60 @@
             <a:r>
               <a:rPr lang="en-US" sz="1800" dirty="0"/>
               <a:t> to “What makes your products and services stand out in your market?”: List products and services with key differentiations</a:t>
+            </a:r>
+          </a:p>
+          <a:p>
+            <a:pPr marL="0" indent="0">
+              <a:buNone/>
+            </a:pPr>
+            <a:r>
+              <a:rPr lang="en-US" sz="1800" dirty="0"/>
+              <a:t>Products:</a:t>
+            </a:r>
+          </a:p>
+          <a:p>
+            <a:pPr marL="0" indent="0">
+              <a:buNone/>
+            </a:pPr>
+            <a:r>
+              <a:rPr lang="en-US" sz="1800" dirty="0"/>
+              <a:t>- </a:t>
+            </a:r>
+          </a:p>
+          <a:p>
+            <a:pPr marL="0" indent="0">
+              <a:buNone/>
+            </a:pPr>
+            <a:r>
+              <a:rPr lang="en-US" sz="1800" dirty="0"/>
+              <a:t>- </a:t>
+            </a:r>
+          </a:p>
+          <a:p>
+            <a:pPr marL="0" indent="0">
+              <a:buNone/>
+            </a:pPr>
+            <a:r>
+              <a:rPr lang="en-US" sz="1800" dirty="0"/>
+              <a:t>Services:</a:t>
+            </a:r>
+          </a:p>
+          <a:p>
+            <a:pPr marL="0" indent="0">
+              <a:buNone/>
+            </a:pPr>
+            <a:r>
+              <a:rPr lang="en-US" sz="1800" dirty="0"/>
+              <a:t>-</a:t>
+            </a:r>
+          </a:p>
+          <a:p>
+            <a:pPr marL="0" indent="0">
+              <a:buNone/>
+            </a:pPr>
+            <a:r>
+              <a:rPr lang="en-US" sz="1800" dirty="0"/>
+              <a:t>-</a:t>
             </a:r>
           </a:p>
         </p:txBody>

</xml_diff>